<commit_message>
updated links to labs
</commit_message>
<xml_diff>
--- a/Instructor-Led/Module1/Lessons/Module1_Lesson4 How to start Azure.pptx
+++ b/Instructor-Led/Module1/Lessons/Module1_Lesson4 How to start Azure.pptx
@@ -154,7 +154,7 @@
       </p14:sectionLst>
     </p:ext>
     <p:ext uri="{EFAFB233-063F-42B5-8137-9DF3F51BA10A}">
-      <p15:sldGuideLst xmlns:p15="http://schemas.microsoft.com/office/powerpoint/2012/main" xmlns="">
+      <p15:sldGuideLst xmlns="" xmlns:p15="http://schemas.microsoft.com/office/powerpoint/2012/main">
         <p15:guide id="1" orient="horz" pos="2160">
           <p15:clr>
             <a:srgbClr val="A4A3A4"/>
@@ -261,7 +261,7 @@
             <a:fld id="{2E5CA586-3557-4985-BCD4-35EF5AC8B4A4}" type="datetimeFigureOut">
               <a:rPr lang="en-US" smtClean="0"/>
               <a:pPr/>
-              <a:t>6/22/16</a:t>
+              <a:t>6/23/16</a:t>
             </a:fld>
             <a:endParaRPr lang="en-US"/>
           </a:p>
@@ -2705,26 +2705,27 @@
             </a:pPr>
             <a:r>
               <a:rPr lang="en-US" b="0" baseline="0" dirty="0" smtClean="0"/>
-              <a:t>The Module 1 </a:t>
-            </a:r>
-            <a:r>
-              <a:rPr lang="en-US" b="0" baseline="0" smtClean="0"/>
-              <a:t>Lesson </a:t>
-            </a:r>
-            <a:r>
-              <a:rPr lang="en-US" b="0" baseline="0" smtClean="0"/>
-              <a:t>4 </a:t>
-            </a:r>
-            <a:r>
-              <a:rPr lang="en-US" b="0" baseline="0" dirty="0" smtClean="0"/>
-              <a:t>Lab should be completed at this time:</a:t>
+              <a:t>The Module 1 Lesson 4 Lab should be completed at this time:</a:t>
             </a:r>
             <a:endParaRPr lang="en-US" dirty="0" smtClean="0"/>
           </a:p>
           <a:p>
-            <a:pPr marL="628650" lvl="1" indent="-171450">
+            <a:pPr marL="628650" marR="0" lvl="1" indent="-171450" algn="l" defTabSz="914400" rtl="0" eaLnBrk="1" fontAlgn="auto" latinLnBrk="0" hangingPunct="1">
+              <a:lnSpc>
+                <a:spcPct val="100000"/>
+              </a:lnSpc>
+              <a:spcBef>
+                <a:spcPts val="0"/>
+              </a:spcBef>
+              <a:spcAft>
+                <a:spcPts val="0"/>
+              </a:spcAft>
+              <a:buClrTx/>
+              <a:buSzTx/>
               <a:buFont typeface="Arial"/>
               <a:buChar char="•"/>
+              <a:tabLst/>
+              <a:defRPr/>
             </a:pPr>
             <a:r>
               <a:rPr lang="en-US" dirty="0" smtClean="0"/>
@@ -2752,8 +2753,21 @@
             </a:r>
             <a:r>
               <a:rPr lang="en-US" dirty="0" smtClean="0"/>
-              <a:t>/tree/master/Instructor-Led/Labs/Module1</a:t>
-            </a:r>
+              <a:t>/tree/master/Instructor-</a:t>
+            </a:r>
+            <a:r>
+              <a:rPr lang="en-US" dirty="0" smtClean="0"/>
+              <a:t>Led</a:t>
+            </a:r>
+            <a:r>
+              <a:rPr lang="en-US" smtClean="0"/>
+              <a:t>/Module1/</a:t>
+            </a:r>
+            <a:r>
+              <a:rPr lang="en-US" dirty="0" smtClean="0"/>
+              <a:t>Labs</a:t>
+            </a:r>
+            <a:endParaRPr lang="en-US" dirty="0" smtClean="0"/>
           </a:p>
         </p:txBody>
       </p:sp>
@@ -23586,7 +23600,7 @@
                 <a:latin typeface="Segoe UI"/>
               </a:rPr>
               <a:pPr/>
-              <a:t>6/22/16</a:t>
+              <a:t>6/23/16</a:t>
             </a:fld>
             <a:endParaRPr lang="en-US">
               <a:solidFill>
@@ -23791,7 +23805,7 @@
                 <a:latin typeface="Segoe UI"/>
               </a:rPr>
               <a:pPr/>
-              <a:t>6/22/16</a:t>
+              <a:t>6/23/16</a:t>
             </a:fld>
             <a:endParaRPr lang="en-US">
               <a:solidFill>
@@ -24089,7 +24103,7 @@
                 <a:latin typeface="Segoe UI"/>
               </a:rPr>
               <a:pPr/>
-              <a:t>6/22/16</a:t>
+              <a:t>6/23/16</a:t>
             </a:fld>
             <a:endParaRPr lang="en-US">
               <a:solidFill>
@@ -24433,7 +24447,7 @@
                 <a:latin typeface="Segoe UI"/>
               </a:rPr>
               <a:pPr/>
-              <a:t>6/22/16</a:t>
+              <a:t>6/23/16</a:t>
             </a:fld>
             <a:endParaRPr lang="en-US">
               <a:solidFill>
@@ -24808,7 +24822,7 @@
                 <a:latin typeface="Segoe UI"/>
               </a:rPr>
               <a:pPr/>
-              <a:t>6/22/16</a:t>
+              <a:t>6/23/16</a:t>
             </a:fld>
             <a:endParaRPr lang="en-US">
               <a:solidFill>
@@ -26315,7 +26329,7 @@
                 <a:latin typeface="Segoe UI"/>
               </a:rPr>
               <a:pPr/>
-              <a:t>6/22/16</a:t>
+              <a:t>6/23/16</a:t>
             </a:fld>
             <a:endParaRPr lang="en-US">
               <a:solidFill>
@@ -26716,7 +26730,7 @@
                 <a:latin typeface="Segoe UI"/>
               </a:rPr>
               <a:pPr/>
-              <a:t>6/22/16</a:t>
+              <a:t>6/23/16</a:t>
             </a:fld>
             <a:endParaRPr lang="en-US">
               <a:solidFill>
@@ -26870,7 +26884,7 @@
                 <a:latin typeface="Segoe UI"/>
               </a:rPr>
               <a:pPr/>
-              <a:t>6/22/16</a:t>
+              <a:t>6/23/16</a:t>
             </a:fld>
             <a:endParaRPr lang="en-US">
               <a:solidFill>
@@ -27002,7 +27016,7 @@
                 <a:latin typeface="Segoe UI"/>
               </a:rPr>
               <a:pPr/>
-              <a:t>6/22/16</a:t>
+              <a:t>6/23/16</a:t>
             </a:fld>
             <a:endParaRPr lang="en-US">
               <a:solidFill>
@@ -27314,7 +27328,7 @@
                 <a:latin typeface="Segoe UI"/>
               </a:rPr>
               <a:pPr/>
-              <a:t>6/22/16</a:t>
+              <a:t>6/23/16</a:t>
             </a:fld>
             <a:endParaRPr lang="en-US">
               <a:solidFill>
@@ -27603,7 +27617,7 @@
                 <a:latin typeface="Segoe UI"/>
               </a:rPr>
               <a:pPr/>
-              <a:t>6/22/16</a:t>
+              <a:t>6/23/16</a:t>
             </a:fld>
             <a:endParaRPr lang="en-US">
               <a:solidFill>
@@ -27808,7 +27822,7 @@
                 <a:latin typeface="Segoe UI"/>
               </a:rPr>
               <a:pPr/>
-              <a:t>6/22/16</a:t>
+              <a:t>6/23/16</a:t>
             </a:fld>
             <a:endParaRPr lang="en-US">
               <a:solidFill>
@@ -28023,7 +28037,7 @@
                 <a:latin typeface="Segoe UI"/>
               </a:rPr>
               <a:pPr/>
-              <a:t>6/22/16</a:t>
+              <a:t>6/23/16</a:t>
             </a:fld>
             <a:endParaRPr lang="en-US">
               <a:solidFill>
@@ -30822,7 +30836,7 @@
                 <a:latin typeface="Segoe UI"/>
               </a:rPr>
               <a:pPr/>
-              <a:t>6/22/16</a:t>
+              <a:t>6/23/16</a:t>
             </a:fld>
             <a:endParaRPr lang="en-US">
               <a:solidFill>
@@ -36157,14 +36171,14 @@
                 <a:gridCol w="5089072">
                   <a:extLst>
                     <a:ext uri="{9D8B030D-6E8A-4147-A177-3AD203B41FA5}">
-                      <a16:colId xmlns:a16="http://schemas.microsoft.com/office/drawing/2014/main" xmlns="" val="48614039"/>
+                      <a16:colId xmlns="" xmlns:a16="http://schemas.microsoft.com/office/drawing/2014/main" val="48614039"/>
                     </a:ext>
                   </a:extLst>
                 </a:gridCol>
                 <a:gridCol w="5089072">
                   <a:extLst>
                     <a:ext uri="{9D8B030D-6E8A-4147-A177-3AD203B41FA5}">
-                      <a16:colId xmlns:a16="http://schemas.microsoft.com/office/drawing/2014/main" xmlns="" val="20001"/>
+                      <a16:colId xmlns="" xmlns:a16="http://schemas.microsoft.com/office/drawing/2014/main" val="20001"/>
                     </a:ext>
                   </a:extLst>
                 </a:gridCol>
@@ -36229,7 +36243,7 @@
                 </a:tc>
                 <a:extLst>
                   <a:ext uri="{0D108BD9-81ED-4DB2-BD59-A6C34878D82A}">
-                    <a16:rowId xmlns:a16="http://schemas.microsoft.com/office/drawing/2014/main" xmlns="" val="679667022"/>
+                    <a16:rowId xmlns="" xmlns:a16="http://schemas.microsoft.com/office/drawing/2014/main" val="679667022"/>
                   </a:ext>
                 </a:extLst>
               </a:tr>
@@ -36280,7 +36294,7 @@
                 </a:tc>
                 <a:extLst>
                   <a:ext uri="{0D108BD9-81ED-4DB2-BD59-A6C34878D82A}">
-                    <a16:rowId xmlns:a16="http://schemas.microsoft.com/office/drawing/2014/main" xmlns="" val="2034482246"/>
+                    <a16:rowId xmlns="" xmlns:a16="http://schemas.microsoft.com/office/drawing/2014/main" val="2034482246"/>
                   </a:ext>
                 </a:extLst>
               </a:tr>
@@ -36327,7 +36341,7 @@
                 </a:tc>
                 <a:extLst>
                   <a:ext uri="{0D108BD9-81ED-4DB2-BD59-A6C34878D82A}">
-                    <a16:rowId xmlns:a16="http://schemas.microsoft.com/office/drawing/2014/main" xmlns="" val="10002"/>
+                    <a16:rowId xmlns="" xmlns:a16="http://schemas.microsoft.com/office/drawing/2014/main" val="10002"/>
                   </a:ext>
                 </a:extLst>
               </a:tr>
@@ -36379,7 +36393,7 @@
                 </a:tc>
                 <a:extLst>
                   <a:ext uri="{0D108BD9-81ED-4DB2-BD59-A6C34878D82A}">
-                    <a16:rowId xmlns:a16="http://schemas.microsoft.com/office/drawing/2014/main" xmlns="" val="10003"/>
+                    <a16:rowId xmlns="" xmlns:a16="http://schemas.microsoft.com/office/drawing/2014/main" val="10003"/>
                   </a:ext>
                 </a:extLst>
               </a:tr>
@@ -36431,7 +36445,7 @@
                 </a:tc>
                 <a:extLst>
                   <a:ext uri="{0D108BD9-81ED-4DB2-BD59-A6C34878D82A}">
-                    <a16:rowId xmlns:a16="http://schemas.microsoft.com/office/drawing/2014/main" xmlns="" val="10004"/>
+                    <a16:rowId xmlns="" xmlns:a16="http://schemas.microsoft.com/office/drawing/2014/main" val="10004"/>
                   </a:ext>
                 </a:extLst>
               </a:tr>
@@ -36810,21 +36824,21 @@
                 <a:gridCol w="2672822">
                   <a:extLst>
                     <a:ext uri="{9D8B030D-6E8A-4147-A177-3AD203B41FA5}">
-                      <a16:colId xmlns:a16="http://schemas.microsoft.com/office/drawing/2014/main" xmlns="" val="48614039"/>
+                      <a16:colId xmlns="" xmlns:a16="http://schemas.microsoft.com/office/drawing/2014/main" val="48614039"/>
                     </a:ext>
                   </a:extLst>
                 </a:gridCol>
                 <a:gridCol w="3149600">
                   <a:extLst>
                     <a:ext uri="{9D8B030D-6E8A-4147-A177-3AD203B41FA5}">
-                      <a16:colId xmlns:a16="http://schemas.microsoft.com/office/drawing/2014/main" xmlns="" val="20001"/>
+                      <a16:colId xmlns="" xmlns:a16="http://schemas.microsoft.com/office/drawing/2014/main" val="20001"/>
                     </a:ext>
                   </a:extLst>
                 </a:gridCol>
                 <a:gridCol w="4975757">
                   <a:extLst>
                     <a:ext uri="{9D8B030D-6E8A-4147-A177-3AD203B41FA5}">
-                      <a16:colId xmlns:a16="http://schemas.microsoft.com/office/drawing/2014/main" xmlns="" val="20002"/>
+                      <a16:colId xmlns="" xmlns:a16="http://schemas.microsoft.com/office/drawing/2014/main" val="20002"/>
                     </a:ext>
                   </a:extLst>
                 </a:gridCol>
@@ -36898,7 +36912,7 @@
                 </a:tc>
                 <a:extLst>
                   <a:ext uri="{0D108BD9-81ED-4DB2-BD59-A6C34878D82A}">
-                    <a16:rowId xmlns:a16="http://schemas.microsoft.com/office/drawing/2014/main" xmlns="" val="679667022"/>
+                    <a16:rowId xmlns="" xmlns:a16="http://schemas.microsoft.com/office/drawing/2014/main" val="679667022"/>
                   </a:ext>
                 </a:extLst>
               </a:tr>
@@ -37014,7 +37028,7 @@
                 </a:tc>
                 <a:extLst>
                   <a:ext uri="{0D108BD9-81ED-4DB2-BD59-A6C34878D82A}">
-                    <a16:rowId xmlns:a16="http://schemas.microsoft.com/office/drawing/2014/main" xmlns="" val="2034482246"/>
+                    <a16:rowId xmlns="" xmlns:a16="http://schemas.microsoft.com/office/drawing/2014/main" val="2034482246"/>
                   </a:ext>
                 </a:extLst>
               </a:tr>
@@ -37176,7 +37190,7 @@
                 </a:tc>
                 <a:extLst>
                   <a:ext uri="{0D108BD9-81ED-4DB2-BD59-A6C34878D82A}">
-                    <a16:rowId xmlns:a16="http://schemas.microsoft.com/office/drawing/2014/main" xmlns="" val="10002"/>
+                    <a16:rowId xmlns="" xmlns:a16="http://schemas.microsoft.com/office/drawing/2014/main" val="10002"/>
                   </a:ext>
                 </a:extLst>
               </a:tr>
@@ -37338,7 +37352,7 @@
                 </a:tc>
                 <a:extLst>
                   <a:ext uri="{0D108BD9-81ED-4DB2-BD59-A6C34878D82A}">
-                    <a16:rowId xmlns:a16="http://schemas.microsoft.com/office/drawing/2014/main" xmlns="" val="10003"/>
+                    <a16:rowId xmlns="" xmlns:a16="http://schemas.microsoft.com/office/drawing/2014/main" val="10003"/>
                   </a:ext>
                 </a:extLst>
               </a:tr>
@@ -37703,21 +37717,21 @@
                 <a:gridCol w="1267355">
                   <a:extLst>
                     <a:ext uri="{9D8B030D-6E8A-4147-A177-3AD203B41FA5}">
-                      <a16:colId xmlns:a16="http://schemas.microsoft.com/office/drawing/2014/main" xmlns="" val="48614039"/>
+                      <a16:colId xmlns="" xmlns:a16="http://schemas.microsoft.com/office/drawing/2014/main" val="48614039"/>
                     </a:ext>
                   </a:extLst>
                 </a:gridCol>
                 <a:gridCol w="4453466">
                   <a:extLst>
                     <a:ext uri="{9D8B030D-6E8A-4147-A177-3AD203B41FA5}">
-                      <a16:colId xmlns:a16="http://schemas.microsoft.com/office/drawing/2014/main" xmlns="" val="20001"/>
+                      <a16:colId xmlns="" xmlns:a16="http://schemas.microsoft.com/office/drawing/2014/main" val="20001"/>
                     </a:ext>
                   </a:extLst>
                 </a:gridCol>
                 <a:gridCol w="5077358">
                   <a:extLst>
                     <a:ext uri="{9D8B030D-6E8A-4147-A177-3AD203B41FA5}">
-                      <a16:colId xmlns:a16="http://schemas.microsoft.com/office/drawing/2014/main" xmlns="" val="20002"/>
+                      <a16:colId xmlns="" xmlns:a16="http://schemas.microsoft.com/office/drawing/2014/main" val="20002"/>
                     </a:ext>
                   </a:extLst>
                 </a:gridCol>
@@ -37791,7 +37805,7 @@
                 </a:tc>
                 <a:extLst>
                   <a:ext uri="{0D108BD9-81ED-4DB2-BD59-A6C34878D82A}">
-                    <a16:rowId xmlns:a16="http://schemas.microsoft.com/office/drawing/2014/main" xmlns="" val="679667022"/>
+                    <a16:rowId xmlns="" xmlns:a16="http://schemas.microsoft.com/office/drawing/2014/main" val="679667022"/>
                   </a:ext>
                 </a:extLst>
               </a:tr>
@@ -37937,7 +37951,7 @@
                 </a:tc>
                 <a:extLst>
                   <a:ext uri="{0D108BD9-81ED-4DB2-BD59-A6C34878D82A}">
-                    <a16:rowId xmlns:a16="http://schemas.microsoft.com/office/drawing/2014/main" xmlns="" val="2034482246"/>
+                    <a16:rowId xmlns="" xmlns:a16="http://schemas.microsoft.com/office/drawing/2014/main" val="2034482246"/>
                   </a:ext>
                 </a:extLst>
               </a:tr>
@@ -38066,7 +38080,7 @@
                 </a:tc>
                 <a:extLst>
                   <a:ext uri="{0D108BD9-81ED-4DB2-BD59-A6C34878D82A}">
-                    <a16:rowId xmlns:a16="http://schemas.microsoft.com/office/drawing/2014/main" xmlns="" val="10002"/>
+                    <a16:rowId xmlns="" xmlns:a16="http://schemas.microsoft.com/office/drawing/2014/main" val="10002"/>
                   </a:ext>
                 </a:extLst>
               </a:tr>
@@ -38198,7 +38212,7 @@
                 </a:tc>
                 <a:extLst>
                   <a:ext uri="{0D108BD9-81ED-4DB2-BD59-A6C34878D82A}">
-                    <a16:rowId xmlns:a16="http://schemas.microsoft.com/office/drawing/2014/main" xmlns="" val="10003"/>
+                    <a16:rowId xmlns="" xmlns:a16="http://schemas.microsoft.com/office/drawing/2014/main" val="10003"/>
                   </a:ext>
                 </a:extLst>
               </a:tr>
@@ -38812,7 +38826,7 @@
   <a:extraClrSchemeLst/>
   <a:extLst>
     <a:ext uri="{05A4C25C-085E-4340-85A3-A5531E510DB2}">
-      <thm15:themeFamily xmlns:thm15="http://schemas.microsoft.com/office/thememl/2012/main" xmlns="" name="Azure4ResearchTemplate" id="{DD1C6CE8-BDBA-0D4F-9930-3643ABC8EF0E}" vid="{B5C66FD7-0952-994B-96D6-AB3BB89097FE}"/>
+      <thm15:themeFamily xmlns="" xmlns:thm15="http://schemas.microsoft.com/office/thememl/2012/main" name="Azure4ResearchTemplate" id="{DD1C6CE8-BDBA-0D4F-9930-3643ABC8EF0E}" vid="{B5C66FD7-0952-994B-96D6-AB3BB89097FE}"/>
     </a:ext>
   </a:extLst>
 </a:theme>
@@ -39145,7 +39159,7 @@
   <a:extraClrSchemeLst/>
   <a:extLst>
     <a:ext uri="{05A4C25C-085E-4340-85A3-A5531E510DB2}">
-      <thm15:themeFamily xmlns:thm15="http://schemas.microsoft.com/office/thememl/2012/main" xmlns="" name="Azure4ResearchTemplate" id="{DD1C6CE8-BDBA-0D4F-9930-3643ABC8EF0E}" vid="{B5C66FD7-0952-994B-96D6-AB3BB89097FE}"/>
+      <thm15:themeFamily xmlns="" xmlns:thm15="http://schemas.microsoft.com/office/thememl/2012/main" name="Azure4ResearchTemplate" id="{DD1C6CE8-BDBA-0D4F-9930-3643ABC8EF0E}" vid="{B5C66FD7-0952-994B-96D6-AB3BB89097FE}"/>
     </a:ext>
   </a:extLst>
 </a:theme>
@@ -39414,7 +39428,7 @@
   <a:extraClrSchemeLst/>
   <a:extLst>
     <a:ext uri="{05A4C25C-085E-4340-85A3-A5531E510DB2}">
-      <thm15:themeFamily xmlns:thm15="http://schemas.microsoft.com/office/thememl/2012/main" xmlns="" name="Office Theme" id="{62F939B6-93AF-4DB8-9C6B-D6C7DFDC589F}" vid="{4A3C46E8-61CC-4603-A589-7422A47A8E4A}"/>
+      <thm15:themeFamily xmlns="" xmlns:thm15="http://schemas.microsoft.com/office/thememl/2012/main" name="Office Theme" id="{62F939B6-93AF-4DB8-9C6B-D6C7DFDC589F}" vid="{4A3C46E8-61CC-4603-A589-7422A47A8E4A}"/>
     </a:ext>
   </a:extLst>
 </a:theme>
@@ -39675,7 +39689,7 @@
   <a:extraClrSchemeLst/>
   <a:extLst>
     <a:ext uri="{05A4C25C-085E-4340-85A3-A5531E510DB2}">
-      <thm15:themeFamily xmlns:thm15="http://schemas.microsoft.com/office/thememl/2012/main" xmlns="" name="Office Theme" id="{62F939B6-93AF-4DB8-9C6B-D6C7DFDC589F}" vid="{4A3C46E8-61CC-4603-A589-7422A47A8E4A}"/>
+      <thm15:themeFamily xmlns="" xmlns:thm15="http://schemas.microsoft.com/office/thememl/2012/main" name="Office Theme" id="{62F939B6-93AF-4DB8-9C6B-D6C7DFDC589F}" vid="{4A3C46E8-61CC-4603-A589-7422A47A8E4A}"/>
     </a:ext>
   </a:extLst>
 </a:theme>

</xml_diff>